<commit_message>
David Ik Flowchart for lab exercise 1
</commit_message>
<xml_diff>
--- a/Flowchart Assignment.pptx
+++ b/Flowchart Assignment.pptx
@@ -4525,11 +4525,7 @@
           <a:p>
             <a:r>
               <a:rPr lang="en-GB" sz="1400" dirty="0" smtClean="0"/>
-              <a:t>EXERCISE </a:t>
-            </a:r>
-            <a:r>
-              <a:rPr lang="en-GB" sz="1400" dirty="0" smtClean="0"/>
-              <a:t>2</a:t>
+              <a:t>EXERCISE 2</a:t>
             </a:r>
             <a:endParaRPr lang="en-US" sz="1400" dirty="0"/>
           </a:p>
@@ -5545,11 +5541,7 @@
           <a:p>
             <a:r>
               <a:rPr lang="en-GB" sz="1400" dirty="0" smtClean="0"/>
-              <a:t>EXERCISE </a:t>
-            </a:r>
-            <a:r>
-              <a:rPr lang="en-GB" sz="1400" dirty="0" smtClean="0"/>
-              <a:t>3</a:t>
+              <a:t>EXERCISE 3</a:t>
             </a:r>
             <a:endParaRPr lang="en-US" sz="1400" dirty="0"/>
           </a:p>
@@ -5616,11 +5608,7 @@
           <a:p>
             <a:r>
               <a:rPr lang="en-GB" sz="1400" dirty="0" smtClean="0"/>
-              <a:t>EXERCISE </a:t>
-            </a:r>
-            <a:r>
-              <a:rPr lang="en-GB" sz="1400" dirty="0" smtClean="0"/>
-              <a:t>4</a:t>
+              <a:t>EXERCISE 4</a:t>
             </a:r>
             <a:endParaRPr lang="en-US" sz="1400" dirty="0"/>
           </a:p>
@@ -6608,8 +6596,8 @@
         </p:nvSpPr>
         <p:spPr>
           <a:xfrm>
-            <a:off x="660788" y="1010653"/>
-            <a:ext cx="1649275" cy="593558"/>
+            <a:off x="935180" y="985547"/>
+            <a:ext cx="1434019" cy="427449"/>
           </a:xfrm>
           <a:prstGeom prst="flowChartTerminator">
             <a:avLst/>
@@ -6639,6 +6627,506 @@
             <a:r>
               <a:rPr lang="en-GB" dirty="0" smtClean="0"/>
               <a:t>Start</a:t>
+            </a:r>
+            <a:endParaRPr lang="en-US" dirty="0"/>
+          </a:p>
+        </p:txBody>
+      </p:sp>
+      <p:cxnSp>
+        <p:nvCxnSpPr>
+          <p:cNvPr id="5" name="Straight Arrow Connector 4"/>
+          <p:cNvCxnSpPr>
+            <a:stCxn id="3" idx="2"/>
+          </p:cNvCxnSpPr>
+          <p:nvPr/>
+        </p:nvCxnSpPr>
+        <p:spPr>
+          <a:xfrm>
+            <a:off x="1652190" y="1412996"/>
+            <a:ext cx="1823" cy="519035"/>
+          </a:xfrm>
+          <a:prstGeom prst="straightConnector1">
+            <a:avLst/>
+          </a:prstGeom>
+          <a:ln>
+            <a:tailEnd type="triangle"/>
+          </a:ln>
+        </p:spPr>
+        <p:style>
+          <a:lnRef idx="1">
+            <a:schemeClr val="accent1"/>
+          </a:lnRef>
+          <a:fillRef idx="0">
+            <a:schemeClr val="accent1"/>
+          </a:fillRef>
+          <a:effectRef idx="0">
+            <a:schemeClr val="accent1"/>
+          </a:effectRef>
+          <a:fontRef idx="minor">
+            <a:schemeClr val="tx1"/>
+          </a:fontRef>
+        </p:style>
+      </p:cxnSp>
+      <p:sp>
+        <p:nvSpPr>
+          <p:cNvPr id="6" name="Flowchart: Data 5"/>
+          <p:cNvSpPr/>
+          <p:nvPr/>
+        </p:nvSpPr>
+        <p:spPr>
+          <a:xfrm>
+            <a:off x="272422" y="1957137"/>
+            <a:ext cx="2759537" cy="689810"/>
+          </a:xfrm>
+          <a:prstGeom prst="flowChartInputOutput">
+            <a:avLst/>
+          </a:prstGeom>
+        </p:spPr>
+        <p:style>
+          <a:lnRef idx="2">
+            <a:schemeClr val="accent1">
+              <a:shade val="50000"/>
+            </a:schemeClr>
+          </a:lnRef>
+          <a:fillRef idx="1">
+            <a:schemeClr val="accent1"/>
+          </a:fillRef>
+          <a:effectRef idx="0">
+            <a:schemeClr val="accent1"/>
+          </a:effectRef>
+          <a:fontRef idx="minor">
+            <a:schemeClr val="lt1"/>
+          </a:fontRef>
+        </p:style>
+        <p:txBody>
+          <a:bodyPr rtlCol="0" anchor="ctr"/>
+          <a:lstStyle/>
+          <a:p>
+            <a:pPr algn="ctr"/>
+            <a:r>
+              <a:rPr lang="en-GB" dirty="0" smtClean="0"/>
+              <a:t>Input a value for A</a:t>
+            </a:r>
+            <a:endParaRPr lang="en-US" dirty="0"/>
+          </a:p>
+        </p:txBody>
+      </p:sp>
+      <p:cxnSp>
+        <p:nvCxnSpPr>
+          <p:cNvPr id="8" name="Straight Arrow Connector 7"/>
+          <p:cNvCxnSpPr>
+            <a:stCxn id="6" idx="4"/>
+          </p:cNvCxnSpPr>
+          <p:nvPr/>
+        </p:nvCxnSpPr>
+        <p:spPr>
+          <a:xfrm flipH="1">
+            <a:off x="1652189" y="2646947"/>
+            <a:ext cx="2" cy="481263"/>
+          </a:xfrm>
+          <a:prstGeom prst="straightConnector1">
+            <a:avLst/>
+          </a:prstGeom>
+          <a:ln>
+            <a:tailEnd type="triangle"/>
+          </a:ln>
+        </p:spPr>
+        <p:style>
+          <a:lnRef idx="1">
+            <a:schemeClr val="accent1"/>
+          </a:lnRef>
+          <a:fillRef idx="0">
+            <a:schemeClr val="accent1"/>
+          </a:fillRef>
+          <a:effectRef idx="0">
+            <a:schemeClr val="accent1"/>
+          </a:effectRef>
+          <a:fontRef idx="minor">
+            <a:schemeClr val="tx1"/>
+          </a:fontRef>
+        </p:style>
+      </p:cxnSp>
+      <p:cxnSp>
+        <p:nvCxnSpPr>
+          <p:cNvPr id="16" name="Straight Arrow Connector 15"/>
+          <p:cNvCxnSpPr/>
+          <p:nvPr/>
+        </p:nvCxnSpPr>
+        <p:spPr>
+          <a:xfrm flipH="1">
+            <a:off x="1652188" y="3959817"/>
+            <a:ext cx="1" cy="499888"/>
+          </a:xfrm>
+          <a:prstGeom prst="straightConnector1">
+            <a:avLst/>
+          </a:prstGeom>
+          <a:ln>
+            <a:tailEnd type="triangle"/>
+          </a:ln>
+        </p:spPr>
+        <p:style>
+          <a:lnRef idx="1">
+            <a:schemeClr val="accent1"/>
+          </a:lnRef>
+          <a:fillRef idx="0">
+            <a:schemeClr val="accent1"/>
+          </a:fillRef>
+          <a:effectRef idx="0">
+            <a:schemeClr val="accent1"/>
+          </a:effectRef>
+          <a:fontRef idx="minor">
+            <a:schemeClr val="tx1"/>
+          </a:fontRef>
+        </p:style>
+      </p:cxnSp>
+      <p:sp>
+        <p:nvSpPr>
+          <p:cNvPr id="17" name="Flowchart: Data 16"/>
+          <p:cNvSpPr/>
+          <p:nvPr/>
+        </p:nvSpPr>
+        <p:spPr>
+          <a:xfrm>
+            <a:off x="408924" y="4459705"/>
+            <a:ext cx="2486527" cy="689810"/>
+          </a:xfrm>
+          <a:prstGeom prst="flowChartInputOutput">
+            <a:avLst/>
+          </a:prstGeom>
+        </p:spPr>
+        <p:style>
+          <a:lnRef idx="2">
+            <a:schemeClr val="accent1">
+              <a:shade val="50000"/>
+            </a:schemeClr>
+          </a:lnRef>
+          <a:fillRef idx="1">
+            <a:schemeClr val="accent1"/>
+          </a:fillRef>
+          <a:effectRef idx="0">
+            <a:schemeClr val="accent1"/>
+          </a:effectRef>
+          <a:fontRef idx="minor">
+            <a:schemeClr val="lt1"/>
+          </a:fontRef>
+        </p:style>
+        <p:txBody>
+          <a:bodyPr rtlCol="0" anchor="ctr"/>
+          <a:lstStyle/>
+          <a:p>
+            <a:pPr algn="ctr"/>
+            <a:r>
+              <a:rPr lang="en-GB" dirty="0" smtClean="0"/>
+              <a:t>For </a:t>
+            </a:r>
+            <a:r>
+              <a:rPr lang="en-GB" dirty="0" err="1" smtClean="0"/>
+              <a:t>i</a:t>
+            </a:r>
+            <a:r>
+              <a:rPr lang="en-GB" dirty="0" smtClean="0"/>
+              <a:t> in X, return(</a:t>
+            </a:r>
+            <a:r>
+              <a:rPr lang="en-GB" dirty="0" err="1" smtClean="0"/>
+              <a:t>i</a:t>
+            </a:r>
+            <a:r>
+              <a:rPr lang="en-GB" dirty="0" smtClean="0"/>
+              <a:t>**3)</a:t>
+            </a:r>
+            <a:endParaRPr lang="en-US" dirty="0"/>
+          </a:p>
+        </p:txBody>
+      </p:sp>
+      <p:cxnSp>
+        <p:nvCxnSpPr>
+          <p:cNvPr id="19" name="Straight Arrow Connector 18"/>
+          <p:cNvCxnSpPr>
+            <a:stCxn id="17" idx="5"/>
+          </p:cNvCxnSpPr>
+          <p:nvPr/>
+        </p:nvCxnSpPr>
+        <p:spPr>
+          <a:xfrm flipV="1">
+            <a:off x="2646798" y="4791424"/>
+            <a:ext cx="1395813" cy="13186"/>
+          </a:xfrm>
+          <a:prstGeom prst="straightConnector1">
+            <a:avLst/>
+          </a:prstGeom>
+          <a:ln>
+            <a:tailEnd type="triangle"/>
+          </a:ln>
+        </p:spPr>
+        <p:style>
+          <a:lnRef idx="1">
+            <a:schemeClr val="accent1"/>
+          </a:lnRef>
+          <a:fillRef idx="0">
+            <a:schemeClr val="accent1"/>
+          </a:fillRef>
+          <a:effectRef idx="0">
+            <a:schemeClr val="accent1"/>
+          </a:effectRef>
+          <a:fontRef idx="minor">
+            <a:schemeClr val="tx1"/>
+          </a:fontRef>
+        </p:style>
+      </p:cxnSp>
+      <p:sp>
+        <p:nvSpPr>
+          <p:cNvPr id="21" name="Rectangle 20"/>
+          <p:cNvSpPr/>
+          <p:nvPr/>
+        </p:nvSpPr>
+        <p:spPr>
+          <a:xfrm>
+            <a:off x="176166" y="3146833"/>
+            <a:ext cx="2952041" cy="812983"/>
+          </a:xfrm>
+          <a:prstGeom prst="rect">
+            <a:avLst/>
+          </a:prstGeom>
+        </p:spPr>
+        <p:style>
+          <a:lnRef idx="2">
+            <a:schemeClr val="accent1">
+              <a:shade val="50000"/>
+            </a:schemeClr>
+          </a:lnRef>
+          <a:fillRef idx="1">
+            <a:schemeClr val="accent1"/>
+          </a:fillRef>
+          <a:effectRef idx="0">
+            <a:schemeClr val="accent1"/>
+          </a:effectRef>
+          <a:fontRef idx="minor">
+            <a:schemeClr val="lt1"/>
+          </a:fontRef>
+        </p:style>
+        <p:txBody>
+          <a:bodyPr rtlCol="0" anchor="ctr"/>
+          <a:lstStyle/>
+          <a:p>
+            <a:pPr algn="ctr"/>
+            <a:r>
+              <a:rPr lang="en-GB" dirty="0" smtClean="0"/>
+              <a:t>X == range(A) == [1, A – 1]</a:t>
+            </a:r>
+            <a:endParaRPr lang="en-US" dirty="0"/>
+          </a:p>
+        </p:txBody>
+      </p:sp>
+      <p:sp>
+        <p:nvSpPr>
+          <p:cNvPr id="22" name="Rectangle 21"/>
+          <p:cNvSpPr/>
+          <p:nvPr/>
+        </p:nvSpPr>
+        <p:spPr>
+          <a:xfrm>
+            <a:off x="4042611" y="4459705"/>
+            <a:ext cx="2759242" cy="689810"/>
+          </a:xfrm>
+          <a:prstGeom prst="rect">
+            <a:avLst/>
+          </a:prstGeom>
+        </p:spPr>
+        <p:style>
+          <a:lnRef idx="2">
+            <a:schemeClr val="accent1">
+              <a:shade val="50000"/>
+            </a:schemeClr>
+          </a:lnRef>
+          <a:fillRef idx="1">
+            <a:schemeClr val="accent1"/>
+          </a:fillRef>
+          <a:effectRef idx="0">
+            <a:schemeClr val="accent1"/>
+          </a:effectRef>
+          <a:fontRef idx="minor">
+            <a:schemeClr val="lt1"/>
+          </a:fontRef>
+        </p:style>
+        <p:txBody>
+          <a:bodyPr rtlCol="0" anchor="ctr"/>
+          <a:lstStyle/>
+          <a:p>
+            <a:pPr algn="ctr"/>
+            <a:r>
+              <a:rPr lang="en-GB" dirty="0"/>
+              <a:t>Z</a:t>
+            </a:r>
+            <a:r>
+              <a:rPr lang="en-GB" dirty="0" smtClean="0"/>
+              <a:t> = all values of (</a:t>
+            </a:r>
+            <a:r>
+              <a:rPr lang="en-GB" dirty="0" err="1" smtClean="0"/>
+              <a:t>i</a:t>
+            </a:r>
+            <a:r>
+              <a:rPr lang="en-GB" dirty="0" smtClean="0"/>
+              <a:t>**3) in A</a:t>
+            </a:r>
+            <a:endParaRPr lang="en-US" dirty="0"/>
+          </a:p>
+        </p:txBody>
+      </p:sp>
+      <p:cxnSp>
+        <p:nvCxnSpPr>
+          <p:cNvPr id="24" name="Straight Arrow Connector 23"/>
+          <p:cNvCxnSpPr>
+            <a:stCxn id="22" idx="3"/>
+          </p:cNvCxnSpPr>
+          <p:nvPr/>
+        </p:nvCxnSpPr>
+        <p:spPr>
+          <a:xfrm>
+            <a:off x="6801853" y="4804610"/>
+            <a:ext cx="1684421" cy="0"/>
+          </a:xfrm>
+          <a:prstGeom prst="straightConnector1">
+            <a:avLst/>
+          </a:prstGeom>
+          <a:ln>
+            <a:tailEnd type="triangle"/>
+          </a:ln>
+        </p:spPr>
+        <p:style>
+          <a:lnRef idx="1">
+            <a:schemeClr val="accent1"/>
+          </a:lnRef>
+          <a:fillRef idx="0">
+            <a:schemeClr val="accent1"/>
+          </a:fillRef>
+          <a:effectRef idx="0">
+            <a:schemeClr val="accent1"/>
+          </a:effectRef>
+          <a:fontRef idx="minor">
+            <a:schemeClr val="tx1"/>
+          </a:fontRef>
+        </p:style>
+      </p:cxnSp>
+      <p:sp>
+        <p:nvSpPr>
+          <p:cNvPr id="26" name="Flowchart: Data 25"/>
+          <p:cNvSpPr/>
+          <p:nvPr/>
+        </p:nvSpPr>
+        <p:spPr>
+          <a:xfrm>
+            <a:off x="8213558" y="4446519"/>
+            <a:ext cx="2374232" cy="689810"/>
+          </a:xfrm>
+          <a:prstGeom prst="flowChartInputOutput">
+            <a:avLst/>
+          </a:prstGeom>
+        </p:spPr>
+        <p:style>
+          <a:lnRef idx="2">
+            <a:schemeClr val="accent1">
+              <a:shade val="50000"/>
+            </a:schemeClr>
+          </a:lnRef>
+          <a:fillRef idx="1">
+            <a:schemeClr val="accent1"/>
+          </a:fillRef>
+          <a:effectRef idx="0">
+            <a:schemeClr val="accent1"/>
+          </a:effectRef>
+          <a:fontRef idx="minor">
+            <a:schemeClr val="lt1"/>
+          </a:fontRef>
+        </p:style>
+        <p:txBody>
+          <a:bodyPr rtlCol="0" anchor="ctr"/>
+          <a:lstStyle/>
+          <a:p>
+            <a:pPr algn="ctr"/>
+            <a:r>
+              <a:rPr lang="en-GB" dirty="0" smtClean="0"/>
+              <a:t>Print (Z)</a:t>
+            </a:r>
+            <a:endParaRPr lang="en-US" dirty="0"/>
+          </a:p>
+        </p:txBody>
+      </p:sp>
+      <p:cxnSp>
+        <p:nvCxnSpPr>
+          <p:cNvPr id="28" name="Straight Arrow Connector 27"/>
+          <p:cNvCxnSpPr>
+            <a:stCxn id="26" idx="4"/>
+          </p:cNvCxnSpPr>
+          <p:nvPr/>
+        </p:nvCxnSpPr>
+        <p:spPr>
+          <a:xfrm>
+            <a:off x="9400674" y="5136329"/>
+            <a:ext cx="0" cy="590703"/>
+          </a:xfrm>
+          <a:prstGeom prst="straightConnector1">
+            <a:avLst/>
+          </a:prstGeom>
+          <a:ln>
+            <a:tailEnd type="triangle"/>
+          </a:ln>
+        </p:spPr>
+        <p:style>
+          <a:lnRef idx="1">
+            <a:schemeClr val="accent1"/>
+          </a:lnRef>
+          <a:fillRef idx="0">
+            <a:schemeClr val="accent1"/>
+          </a:fillRef>
+          <a:effectRef idx="0">
+            <a:schemeClr val="accent1"/>
+          </a:effectRef>
+          <a:fontRef idx="minor">
+            <a:schemeClr val="tx1"/>
+          </a:fontRef>
+        </p:style>
+      </p:cxnSp>
+      <p:sp>
+        <p:nvSpPr>
+          <p:cNvPr id="29" name="Flowchart: Terminator 28"/>
+          <p:cNvSpPr/>
+          <p:nvPr/>
+        </p:nvSpPr>
+        <p:spPr>
+          <a:xfrm>
+            <a:off x="8213558" y="5727032"/>
+            <a:ext cx="2374232" cy="625642"/>
+          </a:xfrm>
+          <a:prstGeom prst="flowChartTerminator">
+            <a:avLst/>
+          </a:prstGeom>
+        </p:spPr>
+        <p:style>
+          <a:lnRef idx="2">
+            <a:schemeClr val="accent1">
+              <a:shade val="50000"/>
+            </a:schemeClr>
+          </a:lnRef>
+          <a:fillRef idx="1">
+            <a:schemeClr val="accent1"/>
+          </a:fillRef>
+          <a:effectRef idx="0">
+            <a:schemeClr val="accent1"/>
+          </a:effectRef>
+          <a:fontRef idx="minor">
+            <a:schemeClr val="lt1"/>
+          </a:fontRef>
+        </p:style>
+        <p:txBody>
+          <a:bodyPr rtlCol="0" anchor="ctr"/>
+          <a:lstStyle/>
+          <a:p>
+            <a:pPr algn="ctr"/>
+            <a:r>
+              <a:rPr lang="en-GB" dirty="0" smtClean="0"/>
+              <a:t>End</a:t>
             </a:r>
             <a:endParaRPr lang="en-US" dirty="0"/>
           </a:p>

</xml_diff>